<commit_message>
Add assignment guidelines, update syllabus
</commit_message>
<xml_diff>
--- a/Lecture04_MultivariateOLS2/Lecture4_MultivariateOLS2_2022F.pptx
+++ b/Lecture04_MultivariateOLS2/Lecture4_MultivariateOLS2_2022F.pptx
@@ -5,7 +5,7 @@
     <p:sldMasterId id="2147483738" r:id="rId1"/>
   </p:sldMasterIdLst>
   <p:notesMasterIdLst>
-    <p:notesMasterId r:id="rId65"/>
+    <p:notesMasterId r:id="rId66"/>
   </p:notesMasterIdLst>
   <p:sldIdLst>
     <p:sldId id="256" r:id="rId2"/>
@@ -66,11 +66,12 @@
     <p:sldId id="471" r:id="rId57"/>
     <p:sldId id="466" r:id="rId58"/>
     <p:sldId id="468" r:id="rId59"/>
-    <p:sldId id="476" r:id="rId60"/>
-    <p:sldId id="477" r:id="rId61"/>
-    <p:sldId id="467" r:id="rId62"/>
-    <p:sldId id="469" r:id="rId63"/>
-    <p:sldId id="470" r:id="rId64"/>
+    <p:sldId id="478" r:id="rId60"/>
+    <p:sldId id="476" r:id="rId61"/>
+    <p:sldId id="477" r:id="rId62"/>
+    <p:sldId id="467" r:id="rId63"/>
+    <p:sldId id="469" r:id="rId64"/>
+    <p:sldId id="470" r:id="rId65"/>
   </p:sldIdLst>
   <p:sldSz cx="12192000" cy="6858000"/>
   <p:notesSz cx="7010400" cy="9296400"/>
@@ -270,7 +271,7 @@
           <a:p>
             <a:fld id="{EF911157-0FC2-4F06-8D61-FD647FE4E19D}" type="datetimeFigureOut">
               <a:rPr lang="en-US" smtClean="0"/>
-              <a:t>9/19/2022</a:t>
+              <a:t>9/22/2022</a:t>
             </a:fld>
             <a:endParaRPr lang="en-US"/>
           </a:p>
@@ -4045,8 +4046,8 @@
           <a:lstStyle/>
           <a:p>
             <a:r>
-              <a:rPr lang="en-CA" dirty="0"/>
-              <a:t>Measurement error can be the result of an open back door, or selection – what health examples are there? </a:t>
+              <a:rPr lang="en-US" dirty="0"/>
+              <a:t>But when is it really classical? </a:t>
             </a:r>
           </a:p>
         </p:txBody>
@@ -4077,6 +4078,93 @@
     </p:spTree>
     <p:extLst>
       <p:ext uri="{BB962C8B-B14F-4D97-AF65-F5344CB8AC3E}">
+        <p14:creationId xmlns:p14="http://schemas.microsoft.com/office/powerpoint/2010/main" val="3992584939"/>
+      </p:ext>
+    </p:extLst>
+  </p:cSld>
+  <p:clrMapOvr>
+    <a:masterClrMapping/>
+  </p:clrMapOvr>
+</p:notes>
+</file>
+
+<file path=ppt/notesSlides/notesSlide41.xml><?xml version="1.0" encoding="utf-8"?>
+<p:notes xmlns:a="http://schemas.openxmlformats.org/drawingml/2006/main" xmlns:r="http://schemas.openxmlformats.org/officeDocument/2006/relationships" xmlns:p="http://schemas.openxmlformats.org/presentationml/2006/main">
+  <p:cSld>
+    <p:spTree>
+      <p:nvGrpSpPr>
+        <p:cNvPr id="1" name=""/>
+        <p:cNvGrpSpPr/>
+        <p:nvPr/>
+      </p:nvGrpSpPr>
+      <p:grpSpPr>
+        <a:xfrm>
+          <a:off x="0" y="0"/>
+          <a:ext cx="0" cy="0"/>
+          <a:chOff x="0" y="0"/>
+          <a:chExt cx="0" cy="0"/>
+        </a:xfrm>
+      </p:grpSpPr>
+      <p:sp>
+        <p:nvSpPr>
+          <p:cNvPr id="2" name="Slide Image Placeholder 1"/>
+          <p:cNvSpPr>
+            <a:spLocks noGrp="1" noRot="1" noChangeAspect="1"/>
+          </p:cNvSpPr>
+          <p:nvPr>
+            <p:ph type="sldImg"/>
+          </p:nvPr>
+        </p:nvSpPr>
+        <p:spPr/>
+      </p:sp>
+      <p:sp>
+        <p:nvSpPr>
+          <p:cNvPr id="3" name="Notes Placeholder 2"/>
+          <p:cNvSpPr>
+            <a:spLocks noGrp="1"/>
+          </p:cNvSpPr>
+          <p:nvPr>
+            <p:ph type="body" idx="1"/>
+          </p:nvPr>
+        </p:nvSpPr>
+        <p:spPr/>
+        <p:txBody>
+          <a:bodyPr/>
+          <a:lstStyle/>
+          <a:p>
+            <a:r>
+              <a:rPr lang="en-CA" dirty="0"/>
+              <a:t>Measurement error can be the result of an open back door, or selection – what health examples are there? </a:t>
+            </a:r>
+          </a:p>
+        </p:txBody>
+      </p:sp>
+      <p:sp>
+        <p:nvSpPr>
+          <p:cNvPr id="4" name="Slide Number Placeholder 3"/>
+          <p:cNvSpPr>
+            <a:spLocks noGrp="1"/>
+          </p:cNvSpPr>
+          <p:nvPr>
+            <p:ph type="sldNum" sz="quarter" idx="5"/>
+          </p:nvPr>
+        </p:nvSpPr>
+        <p:spPr/>
+        <p:txBody>
+          <a:bodyPr/>
+          <a:lstStyle/>
+          <a:p>
+            <a:fld id="{4AF79E1B-2C51-4B9B-8EA4-26DE9E345AFF}" type="slidenum">
+              <a:rPr lang="en-US" smtClean="0"/>
+              <a:t>60</a:t>
+            </a:fld>
+            <a:endParaRPr lang="en-US"/>
+          </a:p>
+        </p:txBody>
+      </p:sp>
+    </p:spTree>
+    <p:extLst>
+      <p:ext uri="{BB962C8B-B14F-4D97-AF65-F5344CB8AC3E}">
         <p14:creationId xmlns:p14="http://schemas.microsoft.com/office/powerpoint/2010/main" val="2337618453"/>
       </p:ext>
     </p:extLst>
@@ -4087,7 +4175,7 @@
 </p:notes>
 </file>
 
-<file path=ppt/notesSlides/notesSlide41.xml><?xml version="1.0" encoding="utf-8"?>
+<file path=ppt/notesSlides/notesSlide42.xml><?xml version="1.0" encoding="utf-8"?>
 <p:notes xmlns:a="http://schemas.openxmlformats.org/drawingml/2006/main" xmlns:r="http://schemas.openxmlformats.org/officeDocument/2006/relationships" xmlns:p="http://schemas.openxmlformats.org/presentationml/2006/main">
   <p:cSld>
     <p:spTree>
@@ -4155,7 +4243,7 @@
           <a:p>
             <a:fld id="{4AF79E1B-2C51-4B9B-8EA4-26DE9E345AFF}" type="slidenum">
               <a:rPr lang="en-US" smtClean="0"/>
-              <a:t>60</a:t>
+              <a:t>61</a:t>
             </a:fld>
             <a:endParaRPr lang="en-US"/>
           </a:p>
@@ -4763,7 +4851,7 @@
             <a:fld id="{0972D05C-DCFB-4BB6-B49C-AC126BF3ED2C}" type="datetimeFigureOut">
               <a:rPr lang="en-US" smtClean="0"/>
               <a:pPr/>
-              <a:t>9/19/2022</a:t>
+              <a:t>9/22/2022</a:t>
             </a:fld>
             <a:endParaRPr lang="en-US"/>
           </a:p>
@@ -4993,7 +5081,7 @@
             <a:fld id="{0972D05C-DCFB-4BB6-B49C-AC126BF3ED2C}" type="datetimeFigureOut">
               <a:rPr lang="en-US" smtClean="0"/>
               <a:pPr/>
-              <a:t>9/19/2022</a:t>
+              <a:t>9/22/2022</a:t>
             </a:fld>
             <a:endParaRPr lang="en-US"/>
           </a:p>
@@ -5175,7 +5263,7 @@
             <a:fld id="{0972D05C-DCFB-4BB6-B49C-AC126BF3ED2C}" type="datetimeFigureOut">
               <a:rPr lang="en-US" smtClean="0"/>
               <a:pPr/>
-              <a:t>9/19/2022</a:t>
+              <a:t>9/22/2022</a:t>
             </a:fld>
             <a:endParaRPr lang="en-US"/>
           </a:p>
@@ -5347,7 +5435,7 @@
             <a:fld id="{0972D05C-DCFB-4BB6-B49C-AC126BF3ED2C}" type="datetimeFigureOut">
               <a:rPr lang="en-US" smtClean="0"/>
               <a:pPr/>
-              <a:t>9/19/2022</a:t>
+              <a:t>9/22/2022</a:t>
             </a:fld>
             <a:endParaRPr lang="en-US"/>
           </a:p>
@@ -5603,7 +5691,7 @@
             <a:fld id="{0972D05C-DCFB-4BB6-B49C-AC126BF3ED2C}" type="datetimeFigureOut">
               <a:rPr lang="en-US" smtClean="0"/>
               <a:pPr/>
-              <a:t>9/19/2022</a:t>
+              <a:t>9/22/2022</a:t>
             </a:fld>
             <a:endParaRPr lang="en-US"/>
           </a:p>
@@ -5931,7 +6019,7 @@
             <a:fld id="{0972D05C-DCFB-4BB6-B49C-AC126BF3ED2C}" type="datetimeFigureOut">
               <a:rPr lang="en-US" smtClean="0"/>
               <a:pPr/>
-              <a:t>9/19/2022</a:t>
+              <a:t>9/22/2022</a:t>
             </a:fld>
             <a:endParaRPr lang="en-US"/>
           </a:p>
@@ -6384,7 +6472,7 @@
             <a:fld id="{0972D05C-DCFB-4BB6-B49C-AC126BF3ED2C}" type="datetimeFigureOut">
               <a:rPr lang="en-US" smtClean="0"/>
               <a:pPr/>
-              <a:t>9/19/2022</a:t>
+              <a:t>9/22/2022</a:t>
             </a:fld>
             <a:endParaRPr lang="en-US"/>
           </a:p>
@@ -6504,7 +6592,7 @@
             <a:fld id="{0972D05C-DCFB-4BB6-B49C-AC126BF3ED2C}" type="datetimeFigureOut">
               <a:rPr lang="en-US" smtClean="0"/>
               <a:pPr/>
-              <a:t>9/19/2022</a:t>
+              <a:t>9/22/2022</a:t>
             </a:fld>
             <a:endParaRPr lang="en-US"/>
           </a:p>
@@ -6601,7 +6689,7 @@
             <a:fld id="{0972D05C-DCFB-4BB6-B49C-AC126BF3ED2C}" type="datetimeFigureOut">
               <a:rPr lang="en-US" smtClean="0"/>
               <a:pPr/>
-              <a:t>9/19/2022</a:t>
+              <a:t>9/22/2022</a:t>
             </a:fld>
             <a:endParaRPr lang="en-US"/>
           </a:p>
@@ -6890,7 +6978,7 @@
             <a:fld id="{0972D05C-DCFB-4BB6-B49C-AC126BF3ED2C}" type="datetimeFigureOut">
               <a:rPr lang="en-US" smtClean="0"/>
               <a:pPr/>
-              <a:t>9/19/2022</a:t>
+              <a:t>9/22/2022</a:t>
             </a:fld>
             <a:endParaRPr lang="en-US"/>
           </a:p>
@@ -7214,7 +7302,7 @@
             <a:fld id="{0972D05C-DCFB-4BB6-B49C-AC126BF3ED2C}" type="datetimeFigureOut">
               <a:rPr lang="en-US" smtClean="0"/>
               <a:pPr/>
-              <a:t>9/19/2022</a:t>
+              <a:t>9/22/2022</a:t>
             </a:fld>
             <a:endParaRPr lang="en-US"/>
           </a:p>
@@ -7469,7 +7557,7 @@
             <a:fld id="{0972D05C-DCFB-4BB6-B49C-AC126BF3ED2C}" type="datetimeFigureOut">
               <a:rPr lang="en-US" smtClean="0"/>
               <a:pPr/>
-              <a:t>9/19/2022</a:t>
+              <a:t>9/22/2022</a:t>
             </a:fld>
             <a:endParaRPr lang="en-US" dirty="0"/>
           </a:p>
@@ -33653,8 +33741,8 @@
           </a:p>
         </p:txBody>
       </p:sp>
-      <mc:AlternateContent xmlns:mc="http://schemas.openxmlformats.org/markup-compatibility/2006">
-        <mc:Choice xmlns:a14="http://schemas.microsoft.com/office/drawing/2010/main" Requires="a14">
+      <mc:AlternateContent xmlns:mc="http://schemas.openxmlformats.org/markup-compatibility/2006" xmlns:a14="http://schemas.microsoft.com/office/drawing/2010/main">
+        <mc:Choice Requires="a14">
           <p:sp>
             <p:nvSpPr>
               <p:cNvPr id="3" name="Content Placeholder 2"/>
@@ -33924,7 +34012,7 @@
             </p:txBody>
           </p:sp>
         </mc:Choice>
-        <mc:Fallback>
+        <mc:Fallback xmlns="">
           <p:sp>
             <p:nvSpPr>
               <p:cNvPr id="3" name="Content Placeholder 2"/>
@@ -33978,6 +34066,14 @@
 <file path=ppt/slides/slide59.xml><?xml version="1.0" encoding="utf-8"?>
 <p:sld xmlns:a="http://schemas.openxmlformats.org/drawingml/2006/main" xmlns:r="http://schemas.openxmlformats.org/officeDocument/2006/relationships" xmlns:p="http://schemas.openxmlformats.org/presentationml/2006/main">
   <p:cSld>
+    <p:bg>
+      <p:bgPr>
+        <a:solidFill>
+          <a:schemeClr val="bg1"/>
+        </a:solidFill>
+        <a:effectLst/>
+      </p:bgPr>
+    </p:bg>
     <p:spTree>
       <p:nvGrpSpPr>
         <p:cNvPr id="1" name=""/>
@@ -33994,6 +34090,179 @@
       </p:grpSpPr>
       <p:sp>
         <p:nvSpPr>
+          <p:cNvPr id="1031" name="Rectangle 1030">
+            <a:extLst>
+              <a:ext uri="{FF2B5EF4-FFF2-40B4-BE49-F238E27FC236}">
+                <a16:creationId xmlns:a16="http://schemas.microsoft.com/office/drawing/2014/main" id="{5D5E0904-721C-4D68-9EB8-1C9752E329A7}"/>
+              </a:ext>
+              <a:ext uri="{C183D7F6-B498-43B3-948B-1728B52AA6E4}">
+                <adec:decorative xmlns:adec="http://schemas.microsoft.com/office/drawing/2017/decorative" val="1"/>
+              </a:ext>
+            </a:extLst>
+          </p:cNvPr>
+          <p:cNvSpPr>
+            <a:spLocks noGrp="1" noRot="1" noChangeAspect="1" noMove="1" noResize="1" noEditPoints="1" noAdjustHandles="1" noChangeArrowheads="1" noChangeShapeType="1" noTextEdit="1"/>
+          </p:cNvSpPr>
+          <p:nvPr>
+            <p:extLst>
+              <p:ext uri="{386F3935-93C4-4BCD-93E2-E3B085C9AB24}">
+                <p16:designElem xmlns:p16="http://schemas.microsoft.com/office/powerpoint/2015/main" val="1"/>
+              </p:ext>
+            </p:extLst>
+          </p:nvPr>
+        </p:nvSpPr>
+        <p:spPr>
+          <a:xfrm>
+            <a:off x="0" y="0"/>
+            <a:ext cx="457200" cy="6858000"/>
+          </a:xfrm>
+          <a:prstGeom prst="rect">
+            <a:avLst/>
+          </a:prstGeom>
+          <a:solidFill>
+            <a:schemeClr val="accent1"/>
+          </a:solidFill>
+          <a:ln>
+            <a:noFill/>
+          </a:ln>
+        </p:spPr>
+        <p:style>
+          <a:lnRef idx="2">
+            <a:schemeClr val="accent1">
+              <a:shade val="50000"/>
+            </a:schemeClr>
+          </a:lnRef>
+          <a:fillRef idx="1">
+            <a:schemeClr val="accent1"/>
+          </a:fillRef>
+          <a:effectRef idx="0">
+            <a:schemeClr val="accent1"/>
+          </a:effectRef>
+          <a:fontRef idx="minor">
+            <a:schemeClr val="lt1"/>
+          </a:fontRef>
+        </p:style>
+      </p:sp>
+      <p:sp>
+        <p:nvSpPr>
+          <p:cNvPr id="1033" name="Rectangle 1032">
+            <a:extLst>
+              <a:ext uri="{FF2B5EF4-FFF2-40B4-BE49-F238E27FC236}">
+                <a16:creationId xmlns:a16="http://schemas.microsoft.com/office/drawing/2014/main" id="{B298ECBA-3258-45DF-8FD4-7581736BCCBC}"/>
+              </a:ext>
+              <a:ext uri="{C183D7F6-B498-43B3-948B-1728B52AA6E4}">
+                <adec:decorative xmlns:adec="http://schemas.microsoft.com/office/drawing/2017/decorative" val="1"/>
+              </a:ext>
+            </a:extLst>
+          </p:cNvPr>
+          <p:cNvSpPr>
+            <a:spLocks noGrp="1" noRot="1" noChangeAspect="1" noMove="1" noResize="1" noEditPoints="1" noAdjustHandles="1" noChangeArrowheads="1" noChangeShapeType="1" noTextEdit="1"/>
+          </p:cNvSpPr>
+          <p:nvPr>
+            <p:extLst>
+              <p:ext uri="{386F3935-93C4-4BCD-93E2-E3B085C9AB24}">
+                <p16:designElem xmlns:p16="http://schemas.microsoft.com/office/powerpoint/2015/main" val="1"/>
+              </p:ext>
+            </p:extLst>
+          </p:nvPr>
+        </p:nvSpPr>
+        <p:spPr>
+          <a:xfrm>
+            <a:off x="0" y="-3244"/>
+            <a:ext cx="457200" cy="6858000"/>
+          </a:xfrm>
+          <a:prstGeom prst="rect">
+            <a:avLst/>
+          </a:prstGeom>
+          <a:solidFill>
+            <a:srgbClr val="6F6F74"/>
+          </a:solidFill>
+          <a:ln>
+            <a:noFill/>
+          </a:ln>
+        </p:spPr>
+        <p:style>
+          <a:lnRef idx="2">
+            <a:schemeClr val="accent1">
+              <a:shade val="50000"/>
+            </a:schemeClr>
+          </a:lnRef>
+          <a:fillRef idx="1">
+            <a:schemeClr val="accent1"/>
+          </a:fillRef>
+          <a:effectRef idx="0">
+            <a:schemeClr val="accent1"/>
+          </a:effectRef>
+          <a:fontRef idx="minor">
+            <a:schemeClr val="lt1"/>
+          </a:fontRef>
+        </p:style>
+        <p:txBody>
+          <a:bodyPr rtlCol="0" anchor="ctr"/>
+          <a:lstStyle/>
+          <a:p>
+            <a:pPr algn="ctr"/>
+            <a:endParaRPr lang="en-US"/>
+          </a:p>
+        </p:txBody>
+      </p:sp>
+      <p:sp>
+        <p:nvSpPr>
+          <p:cNvPr id="1035" name="Rectangle 1034">
+            <a:extLst>
+              <a:ext uri="{FF2B5EF4-FFF2-40B4-BE49-F238E27FC236}">
+                <a16:creationId xmlns:a16="http://schemas.microsoft.com/office/drawing/2014/main" id="{B62BF453-BD82-4B90-9FE7-51703133806E}"/>
+              </a:ext>
+              <a:ext uri="{C183D7F6-B498-43B3-948B-1728B52AA6E4}">
+                <adec:decorative xmlns:adec="http://schemas.microsoft.com/office/drawing/2017/decorative" val="1"/>
+              </a:ext>
+            </a:extLst>
+          </p:cNvPr>
+          <p:cNvSpPr>
+            <a:spLocks noGrp="1" noRot="1" noChangeAspect="1" noMove="1" noResize="1" noEditPoints="1" noAdjustHandles="1" noChangeArrowheads="1" noChangeShapeType="1" noTextEdit="1"/>
+          </p:cNvSpPr>
+          <p:nvPr>
+            <p:extLst>
+              <p:ext uri="{386F3935-93C4-4BCD-93E2-E3B085C9AB24}">
+                <p16:designElem xmlns:p16="http://schemas.microsoft.com/office/powerpoint/2015/main" val="1"/>
+              </p:ext>
+            </p:extLst>
+          </p:nvPr>
+        </p:nvSpPr>
+        <p:spPr>
+          <a:xfrm>
+            <a:off x="457200" y="0"/>
+            <a:ext cx="10835640" cy="6858000"/>
+          </a:xfrm>
+          <a:prstGeom prst="rect">
+            <a:avLst/>
+          </a:prstGeom>
+          <a:solidFill>
+            <a:srgbClr val="353537"/>
+          </a:solidFill>
+          <a:ln>
+            <a:noFill/>
+          </a:ln>
+        </p:spPr>
+        <p:style>
+          <a:lnRef idx="2">
+            <a:schemeClr val="accent1">
+              <a:shade val="50000"/>
+            </a:schemeClr>
+          </a:lnRef>
+          <a:fillRef idx="1">
+            <a:schemeClr val="accent1"/>
+          </a:fillRef>
+          <a:effectRef idx="0">
+            <a:schemeClr val="accent1"/>
+          </a:effectRef>
+          <a:fontRef idx="minor">
+            <a:schemeClr val="lt1"/>
+          </a:fontRef>
+        </p:style>
+      </p:sp>
+      <p:sp>
+        <p:nvSpPr>
           <p:cNvPr id="2" name="Title 1"/>
           <p:cNvSpPr>
             <a:spLocks noGrp="1"/>
@@ -34004,94 +34273,208 @@
         </p:nvSpPr>
         <p:spPr>
           <a:xfrm>
-            <a:off x="609600" y="337392"/>
-            <a:ext cx="10439400" cy="624840"/>
+            <a:off x="8318090" y="758952"/>
+            <a:ext cx="2802194" cy="4041648"/>
           </a:xfrm>
         </p:spPr>
         <p:txBody>
-          <a:bodyPr>
-            <a:noAutofit/>
+          <a:bodyPr vert="horz" lIns="91440" tIns="45720" rIns="91440" bIns="45720" rtlCol="0" anchor="b">
+            <a:normAutofit/>
           </a:bodyPr>
           <a:lstStyle/>
           <a:p>
+            <a:pPr>
+              <a:lnSpc>
+                <a:spcPct val="85000"/>
+              </a:lnSpc>
+            </a:pPr>
             <a:r>
-              <a:rPr lang="en-US" sz="3600" dirty="0">
-                <a:cs typeface="Times New Roman" panose="02020603050405020304" pitchFamily="18" charset="0"/>
+              <a:rPr lang="en-US" sz="3100">
+                <a:solidFill>
+                  <a:srgbClr val="FFFFFF"/>
+                </a:solidFill>
+                <a:latin typeface="+mj-lt"/>
               </a:rPr>
-              <a:t>Non-Classical Measurement Error: Examples</a:t>
+              <a:t>Classical Measurement Error</a:t>
             </a:r>
-            <a:endParaRPr lang="en-US" sz="3600" dirty="0">
-              <a:latin typeface="Times New Roman" panose="02020603050405020304" pitchFamily="18" charset="0"/>
-              <a:cs typeface="Times New Roman" panose="02020603050405020304" pitchFamily="18" charset="0"/>
-            </a:endParaRPr>
           </a:p>
         </p:txBody>
       </p:sp>
-      <p:sp>
+      <p:sp useBgFill="1">
         <p:nvSpPr>
-          <p:cNvPr id="3" name="Content Placeholder 2"/>
+          <p:cNvPr id="1037" name="Rectangle 1036">
+            <a:extLst>
+              <a:ext uri="{FF2B5EF4-FFF2-40B4-BE49-F238E27FC236}">
+                <a16:creationId xmlns:a16="http://schemas.microsoft.com/office/drawing/2014/main" id="{072366D3-9B5C-42E1-9906-77FF6BB55EAB}"/>
+              </a:ext>
+              <a:ext uri="{C183D7F6-B498-43B3-948B-1728B52AA6E4}">
+                <adec:decorative xmlns:adec="http://schemas.microsoft.com/office/drawing/2017/decorative" val="1"/>
+              </a:ext>
+            </a:extLst>
+          </p:cNvPr>
           <p:cNvSpPr>
-            <a:spLocks noGrp="1"/>
+            <a:spLocks noGrp="1" noRot="1" noChangeAspect="1" noMove="1" noResize="1" noEditPoints="1" noAdjustHandles="1" noChangeArrowheads="1" noChangeShapeType="1" noTextEdit="1"/>
           </p:cNvSpPr>
           <p:nvPr>
-            <p:ph idx="1"/>
+            <p:extLst>
+              <p:ext uri="{386F3935-93C4-4BCD-93E2-E3B085C9AB24}">
+                <p16:designElem xmlns:p16="http://schemas.microsoft.com/office/powerpoint/2015/main" val="1"/>
+              </p:ext>
+            </p:extLst>
           </p:nvPr>
         </p:nvSpPr>
         <p:spPr>
           <a:xfrm>
-            <a:off x="5181600" y="962232"/>
-            <a:ext cx="5791201" cy="5141388"/>
+            <a:off x="452283" y="0"/>
+            <a:ext cx="7561007" cy="6858000"/>
           </a:xfrm>
+          <a:prstGeom prst="rect">
+            <a:avLst/>
+          </a:prstGeom>
+          <a:ln>
+            <a:noFill/>
+          </a:ln>
         </p:spPr>
+        <p:style>
+          <a:lnRef idx="2">
+            <a:schemeClr val="accent1">
+              <a:shade val="50000"/>
+            </a:schemeClr>
+          </a:lnRef>
+          <a:fillRef idx="1">
+            <a:schemeClr val="accent1"/>
+          </a:fillRef>
+          <a:effectRef idx="0">
+            <a:schemeClr val="accent1"/>
+          </a:effectRef>
+          <a:fontRef idx="minor">
+            <a:schemeClr val="lt1"/>
+          </a:fontRef>
+        </p:style>
         <p:txBody>
-          <a:bodyPr>
-            <a:noAutofit/>
-          </a:bodyPr>
+          <a:bodyPr rtlCol="0" anchor="ctr"/>
           <a:lstStyle/>
           <a:p>
-            <a:endParaRPr lang="en-US" sz="2400" dirty="0"/>
-          </a:p>
-          <a:p>
-            <a:endParaRPr lang="en-US" sz="2400" dirty="0">
-              <a:cs typeface="Times New Roman" panose="02020603050405020304" pitchFamily="18" charset="0"/>
-            </a:endParaRPr>
+            <a:pPr algn="ctr"/>
+            <a:endParaRPr lang="en-US"/>
           </a:p>
         </p:txBody>
       </p:sp>
       <p:pic>
         <p:nvPicPr>
-          <p:cNvPr id="5" name="Picture 4">
+          <p:cNvPr id="1026" name="Picture 2" descr="Image">
             <a:extLst>
               <a:ext uri="{FF2B5EF4-FFF2-40B4-BE49-F238E27FC236}">
-                <a16:creationId xmlns:a16="http://schemas.microsoft.com/office/drawing/2014/main" id="{833DCAAB-5201-2614-1BED-604D92B24499}"/>
+                <a16:creationId xmlns:a16="http://schemas.microsoft.com/office/drawing/2014/main" id="{81B31AEC-7023-F3A0-903D-5E618E7D97D1}"/>
               </a:ext>
             </a:extLst>
           </p:cNvPr>
           <p:cNvPicPr>
-            <a:picLocks noChangeAspect="1"/>
+            <a:picLocks noGrp="1" noChangeAspect="1" noChangeArrowheads="1"/>
           </p:cNvPicPr>
-          <p:nvPr/>
+          <p:nvPr>
+            <p:ph idx="1"/>
+          </p:nvPr>
         </p:nvPicPr>
         <p:blipFill>
-          <a:blip r:embed="rId3"/>
+          <a:blip r:embed="rId3">
+            <a:extLst>
+              <a:ext uri="{28A0092B-C50C-407E-A947-70E740481C1C}">
+                <a14:useLocalDpi xmlns:a14="http://schemas.microsoft.com/office/drawing/2010/main" val="0"/>
+              </a:ext>
+            </a:extLst>
+          </a:blip>
           <a:stretch>
             <a:fillRect/>
           </a:stretch>
         </p:blipFill>
-        <p:spPr>
+        <p:spPr bwMode="auto">
           <a:xfrm>
-            <a:off x="685800" y="1013549"/>
-            <a:ext cx="4296375" cy="4201111"/>
+            <a:off x="924375" y="1018887"/>
+            <a:ext cx="6616823" cy="4813738"/>
           </a:xfrm>
           <a:prstGeom prst="rect">
             <a:avLst/>
           </a:prstGeom>
+          <a:noFill/>
+          <a:extLst>
+            <a:ext uri="{909E8E84-426E-40DD-AFC4-6F175D3DCCD1}">
+              <a14:hiddenFill xmlns:a14="http://schemas.microsoft.com/office/drawing/2010/main">
+                <a:solidFill>
+                  <a:srgbClr val="FFFFFF"/>
+                </a:solidFill>
+              </a14:hiddenFill>
+            </a:ext>
+          </a:extLst>
         </p:spPr>
       </p:pic>
+      <p:sp>
+        <p:nvSpPr>
+          <p:cNvPr id="1039" name="Rectangle 1038">
+            <a:extLst>
+              <a:ext uri="{FF2B5EF4-FFF2-40B4-BE49-F238E27FC236}">
+                <a16:creationId xmlns:a16="http://schemas.microsoft.com/office/drawing/2014/main" id="{121F5E60-4E89-4B16-A245-12BD9935998D}"/>
+              </a:ext>
+              <a:ext uri="{C183D7F6-B498-43B3-948B-1728B52AA6E4}">
+                <adec:decorative xmlns:adec="http://schemas.microsoft.com/office/drawing/2017/decorative" val="1"/>
+              </a:ext>
+            </a:extLst>
+          </p:cNvPr>
+          <p:cNvSpPr>
+            <a:spLocks noGrp="1" noRot="1" noChangeAspect="1" noMove="1" noResize="1" noEditPoints="1" noAdjustHandles="1" noChangeArrowheads="1" noChangeShapeType="1" noTextEdit="1"/>
+          </p:cNvSpPr>
+          <p:nvPr>
+            <p:extLst>
+              <p:ext uri="{386F3935-93C4-4BCD-93E2-E3B085C9AB24}">
+                <p16:designElem xmlns:p16="http://schemas.microsoft.com/office/powerpoint/2015/main" val="1"/>
+              </p:ext>
+            </p:extLst>
+          </p:nvPr>
+        </p:nvSpPr>
+        <p:spPr>
+          <a:xfrm>
+            <a:off x="11292840" y="0"/>
+            <a:ext cx="899160" cy="6858000"/>
+          </a:xfrm>
+          <a:prstGeom prst="rect">
+            <a:avLst/>
+          </a:prstGeom>
+          <a:solidFill>
+            <a:srgbClr val="353537"/>
+          </a:solidFill>
+          <a:ln>
+            <a:noFill/>
+          </a:ln>
+        </p:spPr>
+        <p:style>
+          <a:lnRef idx="2">
+            <a:schemeClr val="accent1">
+              <a:shade val="50000"/>
+            </a:schemeClr>
+          </a:lnRef>
+          <a:fillRef idx="1">
+            <a:schemeClr val="accent1"/>
+          </a:fillRef>
+          <a:effectRef idx="0">
+            <a:schemeClr val="accent1"/>
+          </a:effectRef>
+          <a:fontRef idx="minor">
+            <a:schemeClr val="lt1"/>
+          </a:fontRef>
+        </p:style>
+        <p:txBody>
+          <a:bodyPr rtlCol="0" anchor="ctr"/>
+          <a:lstStyle/>
+          <a:p>
+            <a:pPr algn="ctr"/>
+            <a:endParaRPr lang="en-US"/>
+          </a:p>
+        </p:txBody>
+      </p:sp>
     </p:spTree>
     <p:extLst>
       <p:ext uri="{BB962C8B-B14F-4D97-AF65-F5344CB8AC3E}">
-        <p14:creationId xmlns:p14="http://schemas.microsoft.com/office/powerpoint/2010/main" val="1790188087"/>
+        <p14:creationId xmlns:p14="http://schemas.microsoft.com/office/powerpoint/2010/main" val="373290842"/>
       </p:ext>
     </p:extLst>
   </p:cSld>
@@ -34797,8 +35180,134 @@
           </a:p>
         </p:txBody>
       </p:sp>
-      <mc:AlternateContent xmlns:mc="http://schemas.openxmlformats.org/markup-compatibility/2006">
-        <mc:Choice xmlns:a14="http://schemas.microsoft.com/office/drawing/2010/main" Requires="a14">
+      <p:sp>
+        <p:nvSpPr>
+          <p:cNvPr id="3" name="Content Placeholder 2"/>
+          <p:cNvSpPr>
+            <a:spLocks noGrp="1"/>
+          </p:cNvSpPr>
+          <p:nvPr>
+            <p:ph idx="1"/>
+          </p:nvPr>
+        </p:nvSpPr>
+        <p:spPr>
+          <a:xfrm>
+            <a:off x="5181600" y="962232"/>
+            <a:ext cx="5791201" cy="5141388"/>
+          </a:xfrm>
+        </p:spPr>
+        <p:txBody>
+          <a:bodyPr>
+            <a:noAutofit/>
+          </a:bodyPr>
+          <a:lstStyle/>
+          <a:p>
+            <a:endParaRPr lang="en-US" sz="2400" dirty="0"/>
+          </a:p>
+          <a:p>
+            <a:endParaRPr lang="en-US" sz="2400" dirty="0">
+              <a:cs typeface="Times New Roman" panose="02020603050405020304" pitchFamily="18" charset="0"/>
+            </a:endParaRPr>
+          </a:p>
+        </p:txBody>
+      </p:sp>
+      <p:pic>
+        <p:nvPicPr>
+          <p:cNvPr id="5" name="Picture 4">
+            <a:extLst>
+              <a:ext uri="{FF2B5EF4-FFF2-40B4-BE49-F238E27FC236}">
+                <a16:creationId xmlns:a16="http://schemas.microsoft.com/office/drawing/2014/main" id="{833DCAAB-5201-2614-1BED-604D92B24499}"/>
+              </a:ext>
+            </a:extLst>
+          </p:cNvPr>
+          <p:cNvPicPr>
+            <a:picLocks noChangeAspect="1"/>
+          </p:cNvPicPr>
+          <p:nvPr/>
+        </p:nvPicPr>
+        <p:blipFill>
+          <a:blip r:embed="rId3"/>
+          <a:stretch>
+            <a:fillRect/>
+          </a:stretch>
+        </p:blipFill>
+        <p:spPr>
+          <a:xfrm>
+            <a:off x="685800" y="1013549"/>
+            <a:ext cx="4296375" cy="4201111"/>
+          </a:xfrm>
+          <a:prstGeom prst="rect">
+            <a:avLst/>
+          </a:prstGeom>
+        </p:spPr>
+      </p:pic>
+    </p:spTree>
+    <p:extLst>
+      <p:ext uri="{BB962C8B-B14F-4D97-AF65-F5344CB8AC3E}">
+        <p14:creationId xmlns:p14="http://schemas.microsoft.com/office/powerpoint/2010/main" val="1790188087"/>
+      </p:ext>
+    </p:extLst>
+  </p:cSld>
+  <p:clrMapOvr>
+    <a:masterClrMapping/>
+  </p:clrMapOvr>
+</p:sld>
+</file>
+
+<file path=ppt/slides/slide61.xml><?xml version="1.0" encoding="utf-8"?>
+<p:sld xmlns:a="http://schemas.openxmlformats.org/drawingml/2006/main" xmlns:r="http://schemas.openxmlformats.org/officeDocument/2006/relationships" xmlns:p="http://schemas.openxmlformats.org/presentationml/2006/main">
+  <p:cSld>
+    <p:spTree>
+      <p:nvGrpSpPr>
+        <p:cNvPr id="1" name=""/>
+        <p:cNvGrpSpPr/>
+        <p:nvPr/>
+      </p:nvGrpSpPr>
+      <p:grpSpPr>
+        <a:xfrm>
+          <a:off x="0" y="0"/>
+          <a:ext cx="0" cy="0"/>
+          <a:chOff x="0" y="0"/>
+          <a:chExt cx="0" cy="0"/>
+        </a:xfrm>
+      </p:grpSpPr>
+      <p:sp>
+        <p:nvSpPr>
+          <p:cNvPr id="2" name="Title 1"/>
+          <p:cNvSpPr>
+            <a:spLocks noGrp="1"/>
+          </p:cNvSpPr>
+          <p:nvPr>
+            <p:ph type="title"/>
+          </p:nvPr>
+        </p:nvSpPr>
+        <p:spPr>
+          <a:xfrm>
+            <a:off x="609600" y="337392"/>
+            <a:ext cx="10439400" cy="624840"/>
+          </a:xfrm>
+        </p:spPr>
+        <p:txBody>
+          <a:bodyPr>
+            <a:noAutofit/>
+          </a:bodyPr>
+          <a:lstStyle/>
+          <a:p>
+            <a:r>
+              <a:rPr lang="en-US" sz="3600" dirty="0">
+                <a:cs typeface="Times New Roman" panose="02020603050405020304" pitchFamily="18" charset="0"/>
+              </a:rPr>
+              <a:t>Non-Classical Measurement Error: Examples</a:t>
+            </a:r>
+            <a:endParaRPr lang="en-US" sz="3600" dirty="0">
+              <a:latin typeface="Times New Roman" panose="02020603050405020304" pitchFamily="18" charset="0"/>
+              <a:cs typeface="Times New Roman" panose="02020603050405020304" pitchFamily="18" charset="0"/>
+            </a:endParaRPr>
+          </a:p>
+        </p:txBody>
+      </p:sp>
+      <mc:AlternateContent xmlns:mc="http://schemas.openxmlformats.org/markup-compatibility/2006" xmlns:a14="http://schemas.microsoft.com/office/drawing/2010/main">
+        <mc:Choice Requires="a14">
           <p:sp>
             <p:nvSpPr>
               <p:cNvPr id="3" name="Content Placeholder 2"/>
@@ -34857,7 +35366,7 @@
             </p:txBody>
           </p:sp>
         </mc:Choice>
-        <mc:Fallback>
+        <mc:Fallback xmlns="">
           <p:sp>
             <p:nvSpPr>
               <p:cNvPr id="3" name="Content Placeholder 2"/>
@@ -34938,7 +35447,7 @@
 </p:sld>
 </file>
 
-<file path=ppt/slides/slide61.xml><?xml version="1.0" encoding="utf-8"?>
+<file path=ppt/slides/slide62.xml><?xml version="1.0" encoding="utf-8"?>
 <p:sld xmlns:a="http://schemas.openxmlformats.org/drawingml/2006/main" xmlns:r="http://schemas.openxmlformats.org/officeDocument/2006/relationships" xmlns:p="http://schemas.openxmlformats.org/presentationml/2006/main">
   <p:cSld>
     <p:spTree>
@@ -35115,7 +35624,7 @@
 </p:sld>
 </file>
 
-<file path=ppt/slides/slide62.xml><?xml version="1.0" encoding="utf-8"?>
+<file path=ppt/slides/slide63.xml><?xml version="1.0" encoding="utf-8"?>
 <p:sld xmlns:a="http://schemas.openxmlformats.org/drawingml/2006/main" xmlns:r="http://schemas.openxmlformats.org/officeDocument/2006/relationships" xmlns:p="http://schemas.openxmlformats.org/presentationml/2006/main">
   <p:cSld>
     <p:spTree>
@@ -35638,7 +36147,7 @@
 </p:sld>
 </file>
 
-<file path=ppt/slides/slide63.xml><?xml version="1.0" encoding="utf-8"?>
+<file path=ppt/slides/slide64.xml><?xml version="1.0" encoding="utf-8"?>
 <p:sld xmlns:a="http://schemas.openxmlformats.org/drawingml/2006/main" xmlns:r="http://schemas.openxmlformats.org/officeDocument/2006/relationships" xmlns:p="http://schemas.openxmlformats.org/presentationml/2006/main">
   <p:cSld>
     <p:spTree>

</xml_diff>